<commit_message>
day 20 content updated
</commit_message>
<xml_diff>
--- a/Day20/DockerAndKubernetes_Training-Day20.pptx
+++ b/Day20/DockerAndKubernetes_Training-Day20.pptx
@@ -9,9 +9,9 @@
   </p:notesMasterIdLst>
   <p:sldIdLst>
     <p:sldId id="439" r:id="rId2"/>
-    <p:sldId id="442" r:id="rId3"/>
-    <p:sldId id="448" r:id="rId4"/>
-    <p:sldId id="438" r:id="rId5"/>
+    <p:sldId id="449" r:id="rId3"/>
+    <p:sldId id="450" r:id="rId4"/>
+    <p:sldId id="451" r:id="rId5"/>
   </p:sldIdLst>
   <p:sldSz cx="12192000" cy="6858000"/>
   <p:notesSz cx="6858000" cy="9144000"/>
@@ -200,7 +200,7 @@
           <a:p>
             <a:fld id="{B09F413D-6E72-4B8A-80ED-A580F7C91B71}" type="datetimeFigureOut">
               <a:rPr lang="en-IN" smtClean="0"/>
-              <a:t>01-05-2023</a:t>
+              <a:t>02-05-2023</a:t>
             </a:fld>
             <a:endParaRPr lang="en-IN"/>
           </a:p>
@@ -803,7 +803,7 @@
           <a:p>
             <a:fld id="{12E8600E-B0EE-4521-BF40-4B72FBA06775}" type="datetimeFigureOut">
               <a:rPr lang="en-IN" smtClean="0"/>
-              <a:t>01-05-2023</a:t>
+              <a:t>02-05-2023</a:t>
             </a:fld>
             <a:endParaRPr lang="en-IN"/>
           </a:p>
@@ -1892,7 +1892,7 @@
             <a:fld id="{49F3E739-D457-46E5-B626-C9B182A007EE}" type="datetimeFigureOut">
               <a:rPr lang="en-US" smtClean="0"/>
               <a:pPr/>
-              <a:t>5/1/2023</a:t>
+              <a:t>5/2/2023</a:t>
             </a:fld>
             <a:endParaRPr lang="en-US"/>
           </a:p>
@@ -2874,7 +2874,7 @@
             <a:fld id="{49F3E739-D457-46E5-B626-C9B182A007EE}" type="datetimeFigureOut">
               <a:rPr lang="en-US" smtClean="0"/>
               <a:pPr/>
-              <a:t>5/1/2023</a:t>
+              <a:t>5/2/2023</a:t>
             </a:fld>
             <a:endParaRPr lang="en-US"/>
           </a:p>
@@ -4010,7 +4010,7 @@
             <a:fld id="{49F3E739-D457-46E5-B626-C9B182A007EE}" type="datetimeFigureOut">
               <a:rPr lang="en-US" smtClean="0"/>
               <a:pPr/>
-              <a:t>5/1/2023</a:t>
+              <a:t>5/2/2023</a:t>
             </a:fld>
             <a:endParaRPr lang="en-US"/>
           </a:p>
@@ -5045,7 +5045,7 @@
             <a:fld id="{49F3E739-D457-46E5-B626-C9B182A007EE}" type="datetimeFigureOut">
               <a:rPr lang="en-US" smtClean="0"/>
               <a:pPr/>
-              <a:t>5/1/2023</a:t>
+              <a:t>5/2/2023</a:t>
             </a:fld>
             <a:endParaRPr lang="en-US"/>
           </a:p>
@@ -5707,7 +5707,7 @@
             <a:fld id="{49F3E739-D457-46E5-B626-C9B182A007EE}" type="datetimeFigureOut">
               <a:rPr lang="en-US" smtClean="0"/>
               <a:pPr/>
-              <a:t>5/1/2023</a:t>
+              <a:t>5/2/2023</a:t>
             </a:fld>
             <a:endParaRPr lang="en-US"/>
           </a:p>
@@ -6570,7 +6570,7 @@
             <a:fld id="{49F3E739-D457-46E5-B626-C9B182A007EE}" type="datetimeFigureOut">
               <a:rPr lang="en-US" smtClean="0"/>
               <a:pPr/>
-              <a:t>5/1/2023</a:t>
+              <a:t>5/2/2023</a:t>
             </a:fld>
             <a:endParaRPr lang="en-US"/>
           </a:p>
@@ -6761,7 +6761,7 @@
           <a:p>
             <a:fld id="{12E8600E-B0EE-4521-BF40-4B72FBA06775}" type="datetimeFigureOut">
               <a:rPr lang="en-IN" smtClean="0"/>
-              <a:t>01-05-2023</a:t>
+              <a:t>02-05-2023</a:t>
             </a:fld>
             <a:endParaRPr lang="en-IN"/>
           </a:p>
@@ -7733,7 +7733,7 @@
           <a:p>
             <a:fld id="{12E8600E-B0EE-4521-BF40-4B72FBA06775}" type="datetimeFigureOut">
               <a:rPr lang="en-IN" smtClean="0"/>
-              <a:t>01-05-2023</a:t>
+              <a:t>02-05-2023</a:t>
             </a:fld>
             <a:endParaRPr lang="en-IN"/>
           </a:p>
@@ -7944,7 +7944,7 @@
           <a:p>
             <a:fld id="{12E8600E-B0EE-4521-BF40-4B72FBA06775}" type="datetimeFigureOut">
               <a:rPr lang="en-IN" smtClean="0"/>
-              <a:t>01-05-2023</a:t>
+              <a:t>02-05-2023</a:t>
             </a:fld>
             <a:endParaRPr lang="en-IN"/>
           </a:p>
@@ -8978,7 +8978,7 @@
           <a:p>
             <a:fld id="{12E8600E-B0EE-4521-BF40-4B72FBA06775}" type="datetimeFigureOut">
               <a:rPr lang="en-IN" smtClean="0"/>
-              <a:t>01-05-2023</a:t>
+              <a:t>02-05-2023</a:t>
             </a:fld>
             <a:endParaRPr lang="en-IN"/>
           </a:p>
@@ -9250,7 +9250,7 @@
           <a:p>
             <a:fld id="{12E8600E-B0EE-4521-BF40-4B72FBA06775}" type="datetimeFigureOut">
               <a:rPr lang="en-IN" smtClean="0"/>
-              <a:t>01-05-2023</a:t>
+              <a:t>02-05-2023</a:t>
             </a:fld>
             <a:endParaRPr lang="en-IN"/>
           </a:p>
@@ -9661,7 +9661,7 @@
             <a:fld id="{49F3E739-D457-46E5-B626-C9B182A007EE}" type="datetimeFigureOut">
               <a:rPr lang="en-US" smtClean="0"/>
               <a:pPr/>
-              <a:t>5/1/2023</a:t>
+              <a:t>5/2/2023</a:t>
             </a:fld>
             <a:endParaRPr lang="en-US"/>
           </a:p>
@@ -9789,7 +9789,7 @@
           <a:p>
             <a:fld id="{12E8600E-B0EE-4521-BF40-4B72FBA06775}" type="datetimeFigureOut">
               <a:rPr lang="en-IN" smtClean="0"/>
-              <a:t>01-05-2023</a:t>
+              <a:t>02-05-2023</a:t>
             </a:fld>
             <a:endParaRPr lang="en-IN"/>
           </a:p>
@@ -9884,7 +9884,7 @@
           <a:p>
             <a:fld id="{12E8600E-B0EE-4521-BF40-4B72FBA06775}" type="datetimeFigureOut">
               <a:rPr lang="en-IN" smtClean="0"/>
-              <a:t>01-05-2023</a:t>
+              <a:t>02-05-2023</a:t>
             </a:fld>
             <a:endParaRPr lang="en-IN"/>
           </a:p>
@@ -10965,7 +10965,7 @@
           <a:p>
             <a:fld id="{12E8600E-B0EE-4521-BF40-4B72FBA06775}" type="datetimeFigureOut">
               <a:rPr lang="en-IN" smtClean="0"/>
-              <a:t>01-05-2023</a:t>
+              <a:t>02-05-2023</a:t>
             </a:fld>
             <a:endParaRPr lang="en-IN"/>
           </a:p>
@@ -12074,7 +12074,7 @@
             <a:fld id="{49F3E739-D457-46E5-B626-C9B182A007EE}" type="datetimeFigureOut">
               <a:rPr lang="en-US" smtClean="0"/>
               <a:pPr/>
-              <a:t>5/1/2023</a:t>
+              <a:t>5/2/2023</a:t>
             </a:fld>
             <a:endParaRPr lang="en-US"/>
           </a:p>
@@ -13073,7 +13073,7 @@
             <a:fld id="{49F3E739-D457-46E5-B626-C9B182A007EE}" type="datetimeFigureOut">
               <a:rPr lang="en-US" smtClean="0"/>
               <a:pPr/>
-              <a:t>5/1/2023</a:t>
+              <a:t>5/2/2023</a:t>
             </a:fld>
             <a:endParaRPr lang="en-US"/>
           </a:p>
@@ -13661,7 +13661,7 @@
           <a:p>
             <a:r>
               <a:rPr lang="en-US" sz="4800" b="1" i="1" dirty="0"/>
-              <a:t>DAY 18</a:t>
+              <a:t>DAY 20</a:t>
             </a:r>
             <a:endParaRPr lang="en-IN" sz="4800" b="1" i="1" dirty="0"/>
           </a:p>
@@ -14032,63 +14032,39 @@
           <a:p>
             <a:r>
               <a:rPr lang="en-US" dirty="0"/>
-              <a:t>Any query from previous session</a:t>
+              <a:t>Recap/Any query from previous session</a:t>
             </a:r>
           </a:p>
           <a:p>
             <a:r>
               <a:rPr lang="en-US" dirty="0"/>
-              <a:t>Docker Swarm – Concept understanding</a:t>
+              <a:t>Docker Swarm – Deep Dive</a:t>
             </a:r>
           </a:p>
           <a:p>
             <a:pPr lvl="1"/>
             <a:r>
               <a:rPr lang="en-US" dirty="0"/>
-              <a:t>Swarm Mode Overview</a:t>
+              <a:t>Manage Configuration</a:t>
             </a:r>
           </a:p>
           <a:p>
             <a:pPr lvl="1"/>
             <a:r>
               <a:rPr lang="en-US" dirty="0"/>
-              <a:t>Host only network setup</a:t>
+              <a:t>Manage Sensitive data – Secrets</a:t>
             </a:r>
           </a:p>
           <a:p>
             <a:pPr lvl="1"/>
             <a:r>
               <a:rPr lang="en-US" dirty="0"/>
-              <a:t>Swarm Mode Installation</a:t>
+              <a:t>Manage Swarm Deploy</a:t>
             </a:r>
           </a:p>
           <a:p>
             <a:pPr lvl="1"/>
-            <a:r>
-              <a:rPr lang="en-US" dirty="0"/>
-              <a:t>Swarm – operations at node level</a:t>
-            </a:r>
-          </a:p>
-          <a:p>
-            <a:pPr lvl="1"/>
-            <a:r>
-              <a:rPr lang="en-US" dirty="0"/>
-              <a:t>Manage nodes</a:t>
-            </a:r>
-          </a:p>
-          <a:p>
-            <a:pPr lvl="1"/>
-            <a:r>
-              <a:rPr lang="en-US" dirty="0"/>
-              <a:t>Availability/Drain</a:t>
-            </a:r>
-          </a:p>
-          <a:p>
-            <a:pPr lvl="1"/>
-            <a:r>
-              <a:rPr lang="en-US" dirty="0"/>
-              <a:t>Manager/Worker Node - Operations</a:t>
-            </a:r>
+            <a:endParaRPr lang="en-US" dirty="0"/>
           </a:p>
           <a:p>
             <a:pPr marL="914400" lvl="2" indent="0">
@@ -14137,7 +14113,7 @@
     </p:spTree>
     <p:extLst>
       <p:ext uri="{BB962C8B-B14F-4D97-AF65-F5344CB8AC3E}">
-        <p14:creationId xmlns:p14="http://schemas.microsoft.com/office/powerpoint/2010/main" val="143344179"/>
+        <p14:creationId xmlns:p14="http://schemas.microsoft.com/office/powerpoint/2010/main" val="4021812436"/>
       </p:ext>
     </p:extLst>
   </p:cSld>
@@ -14217,71 +14193,77 @@
         </p:spPr>
         <p:txBody>
           <a:bodyPr>
-            <a:normAutofit fontScale="92500"/>
+            <a:normAutofit/>
           </a:bodyPr>
           <a:lstStyle/>
           <a:p>
             <a:r>
               <a:rPr lang="en-US" dirty="0"/>
-              <a:t>Run Docker Engine in Swarm Mode - https://docs.docker.com/engine/swarm/swarm-mode/</a:t>
-            </a:r>
-          </a:p>
-          <a:p>
-            <a:r>
-              <a:rPr lang="en-US" dirty="0"/>
-              <a:t>Join Node -https://docs.docker.com/engine/swarm/join-nodes/</a:t>
-            </a:r>
-          </a:p>
-          <a:p>
-            <a:r>
-              <a:rPr lang="en-US" dirty="0"/>
-              <a:t>Manage nodes in Swarm - https://docs.docker.com/engine/swarm/manage-nodes/</a:t>
-            </a:r>
-          </a:p>
-          <a:p>
-            <a:r>
-              <a:rPr lang="en-US" dirty="0"/>
-              <a:t>Swarm Task State - </a:t>
+              <a:t>Swarm </a:t>
             </a:r>
             <a:r>
-              <a:rPr lang="en-US" dirty="0">
+              <a:rPr lang="en-US"/>
+              <a:t>Task State - </a:t>
+            </a:r>
+            <a:r>
+              <a:rPr lang="en-US">
                 <a:hlinkClick r:id="rId2"/>
               </a:rPr>
               <a:t>https://docs.docker.com/engine/swarm/how-swarm-mode-works/swarm-task-states/</a:t>
             </a:r>
-            <a:endParaRPr lang="en-US" dirty="0"/>
+            <a:endParaRPr lang="en-US"/>
           </a:p>
           <a:p>
             <a:r>
               <a:rPr lang="en-US" dirty="0"/>
-              <a:t>Swarm Admin Guide - </a:t>
+              <a:t>Store Configuration - </a:t>
             </a:r>
             <a:r>
               <a:rPr lang="en-US" dirty="0">
                 <a:hlinkClick r:id="rId3"/>
               </a:rPr>
-              <a:t>https://docs.docker.com/engine/swarm/admin_guide/</a:t>
+              <a:t>https://docs.docker.com/engine/swarm/configs/</a:t>
             </a:r>
             <a:endParaRPr lang="en-US" dirty="0"/>
           </a:p>
           <a:p>
             <a:r>
               <a:rPr lang="en-US" dirty="0"/>
-              <a:t>Swarm DR - </a:t>
+              <a:t>Manage Sensitive data - </a:t>
             </a:r>
             <a:r>
               <a:rPr lang="en-US" dirty="0">
                 <a:hlinkClick r:id="rId4"/>
               </a:rPr>
-              <a:t>https://docs.docker.com/engine/swarm/admin_guide/#recover-from-disaster</a:t>
+              <a:t>https://docs.docker.com/engine/swarm/secrets/</a:t>
             </a:r>
             <a:endParaRPr lang="en-US" dirty="0"/>
           </a:p>
           <a:p>
             <a:r>
               <a:rPr lang="en-US" dirty="0"/>
-              <a:t>Raft Consensus - https://docs.docker.com/engine/swarm/raft/</a:t>
+              <a:t>Manage Swarm Service N/W - </a:t>
             </a:r>
+            <a:r>
+              <a:rPr lang="en-US" dirty="0">
+                <a:hlinkClick r:id="rId5"/>
+              </a:rPr>
+              <a:t>https://docs.docker.com/engine/swarm/networking/</a:t>
+            </a:r>
+            <a:endParaRPr lang="en-US" dirty="0"/>
+          </a:p>
+          <a:p>
+            <a:r>
+              <a:rPr lang="en-US" dirty="0"/>
+              <a:t>Swarm Deploy - </a:t>
+            </a:r>
+            <a:r>
+              <a:rPr lang="en-US" dirty="0">
+                <a:hlinkClick r:id="rId6"/>
+              </a:rPr>
+              <a:t>https://docs.docker.com/get-started/swarm-deploy/</a:t>
+            </a:r>
+            <a:endParaRPr lang="en-US" dirty="0"/>
           </a:p>
           <a:p>
             <a:pPr marL="0" indent="0">
@@ -14309,7 +14291,7 @@
     </p:spTree>
     <p:extLst>
       <p:ext uri="{BB962C8B-B14F-4D97-AF65-F5344CB8AC3E}">
-        <p14:creationId xmlns:p14="http://schemas.microsoft.com/office/powerpoint/2010/main" val="614320893"/>
+        <p14:creationId xmlns:p14="http://schemas.microsoft.com/office/powerpoint/2010/main" val="1929519950"/>
       </p:ext>
     </p:extLst>
   </p:cSld>
@@ -14395,46 +14377,13 @@
           <a:p>
             <a:r>
               <a:rPr lang="en-IN" dirty="0"/>
-              <a:t>Docker Swarm - Overview</a:t>
+              <a:t>Docker Swarm – More Insights</a:t>
             </a:r>
           </a:p>
           <a:p>
             <a:r>
               <a:rPr lang="en-IN" dirty="0"/>
-              <a:t>Docker official links for reference</a:t>
-            </a:r>
-          </a:p>
-          <a:p>
-            <a:r>
-              <a:rPr lang="en-IN" dirty="0"/>
-              <a:t>Docker Host Only Network </a:t>
-            </a:r>
-            <a:r>
-              <a:rPr lang="en-IN"/>
-              <a:t>setup reference</a:t>
-            </a:r>
-            <a:endParaRPr lang="en-IN" dirty="0"/>
-          </a:p>
-          <a:p>
-            <a:r>
-              <a:rPr lang="en-IN" dirty="0"/>
-              <a:t>Docker swarm reference guide</a:t>
-            </a:r>
-          </a:p>
-          <a:p>
-            <a:r>
-              <a:rPr lang="en-IN" dirty="0"/>
-              <a:t>Docker Swarm installation steps: </a:t>
-            </a:r>
-          </a:p>
-          <a:p>
-            <a:pPr lvl="1">
-              <a:buFont typeface="Wingdings" panose="05000000000000000000" pitchFamily="2" charset="2"/>
-              <a:buChar char="Ø"/>
-            </a:pPr>
-            <a:r>
-              <a:rPr lang="en-IN" dirty="0"/>
-              <a:t>https://www.ibm.com/docs/ru/planning-analytics/2.0.0?topic=swarm-create-docker</a:t>
+              <a:t>Refer note section for detailed execution reference</a:t>
             </a:r>
           </a:p>
           <a:p>
@@ -14458,7 +14407,7 @@
     </p:spTree>
     <p:extLst>
       <p:ext uri="{BB962C8B-B14F-4D97-AF65-F5344CB8AC3E}">
-        <p14:creationId xmlns:p14="http://schemas.microsoft.com/office/powerpoint/2010/main" val="2726587708"/>
+        <p14:creationId xmlns:p14="http://schemas.microsoft.com/office/powerpoint/2010/main" val="2362687603"/>
       </p:ext>
     </p:extLst>
   </p:cSld>

</xml_diff>

<commit_message>
updated day 20 content
</commit_message>
<xml_diff>
--- a/Day20/DockerAndKubernetes_Training-Day20.pptx
+++ b/Day20/DockerAndKubernetes_Training-Day20.pptx
@@ -14045,6 +14045,20 @@
             <a:pPr lvl="1"/>
             <a:r>
               <a:rPr lang="en-US" dirty="0"/>
+              <a:t>Docker swarm task state</a:t>
+            </a:r>
+          </a:p>
+          <a:p>
+            <a:pPr lvl="1"/>
+            <a:r>
+              <a:rPr lang="en-US" dirty="0"/>
+              <a:t>Docker swarm ingress</a:t>
+            </a:r>
+          </a:p>
+          <a:p>
+            <a:pPr lvl="1"/>
+            <a:r>
+              <a:rPr lang="en-US" dirty="0"/>
               <a:t>Manage Configuration</a:t>
             </a:r>
           </a:p>
@@ -14059,7 +14073,7 @@
             <a:pPr lvl="1"/>
             <a:r>
               <a:rPr lang="en-US" dirty="0"/>
-              <a:t>Manage Swarm Deploy</a:t>
+              <a:t>Docker Stack deploy</a:t>
             </a:r>
           </a:p>
           <a:p>
@@ -14199,19 +14213,15 @@
           <a:p>
             <a:r>
               <a:rPr lang="en-US" dirty="0"/>
-              <a:t>Swarm </a:t>
+              <a:t>Swarm Task State - </a:t>
             </a:r>
             <a:r>
-              <a:rPr lang="en-US"/>
-              <a:t>Task State - </a:t>
-            </a:r>
-            <a:r>
-              <a:rPr lang="en-US">
+              <a:rPr lang="en-US" dirty="0">
                 <a:hlinkClick r:id="rId2"/>
               </a:rPr>
               <a:t>https://docs.docker.com/engine/swarm/how-swarm-mode-works/swarm-task-states/</a:t>
             </a:r>
-            <a:endParaRPr lang="en-US"/>
+            <a:endParaRPr lang="en-US" dirty="0"/>
           </a:p>
           <a:p>
             <a:r>
@@ -14256,6 +14266,32 @@
             <a:r>
               <a:rPr lang="en-US" dirty="0"/>
               <a:t>Swarm Deploy - </a:t>
+            </a:r>
+            <a:r>
+              <a:rPr lang="en-US" dirty="0">
+                <a:hlinkClick r:id="rId6"/>
+              </a:rPr>
+              <a:t>https://docs.docker.com/get-started/swarm-deploy/</a:t>
+            </a:r>
+            <a:endParaRPr lang="en-US" dirty="0"/>
+          </a:p>
+          <a:p>
+            <a:r>
+              <a:rPr lang="en-US" dirty="0"/>
+              <a:t>Docker Swarm Ingress - </a:t>
+            </a:r>
+            <a:r>
+              <a:rPr lang="en-US" dirty="0">
+                <a:hlinkClick r:id="rId7"/>
+              </a:rPr>
+              <a:t>https://docs.docker.com/engine/swarm/ingress/</a:t>
+            </a:r>
+            <a:endParaRPr lang="en-US" dirty="0"/>
+          </a:p>
+          <a:p>
+            <a:r>
+              <a:rPr lang="en-US" dirty="0"/>
+              <a:t>Docker Stack - </a:t>
             </a:r>
             <a:r>
               <a:rPr lang="en-US" dirty="0">

</xml_diff>